<commit_message>
Update introduction for JavaOne4Kids.
</commit_message>
<xml_diff>
--- a/scratch-leapmotion/instructions/en/Introduction-Scratch.pptx
+++ b/scratch-leapmotion/instructions/en/Introduction-Scratch.pptx
@@ -5,10 +5,10 @@
     <p:sldMasterId id="2147483648" r:id="rId1"/>
   </p:sldMasterIdLst>
   <p:notesMasterIdLst>
-    <p:notesMasterId r:id="rId26"/>
+    <p:notesMasterId r:id="rId27"/>
   </p:notesMasterIdLst>
   <p:handoutMasterIdLst>
-    <p:handoutMasterId r:id="rId27"/>
+    <p:handoutMasterId r:id="rId28"/>
   </p:handoutMasterIdLst>
   <p:sldIdLst>
     <p:sldId id="256" r:id="rId2"/>
@@ -35,6 +35,7 @@
     <p:sldId id="274" r:id="rId23"/>
     <p:sldId id="278" r:id="rId24"/>
     <p:sldId id="272" r:id="rId25"/>
+    <p:sldId id="286" r:id="rId26"/>
   </p:sldIdLst>
   <p:sldSz cx="9144000" cy="6858000" type="screen4x3"/>
   <p:notesSz cx="6858000" cy="9144000"/>
@@ -218,7 +219,7 @@
           <a:p>
             <a:fld id="{FD5240AD-D0E5-8743-BED0-4875EEDE37D1}" type="datetimeFigureOut">
               <a:rPr lang="en-US" smtClean="0"/>
-              <a:t>14/10/15</a:t>
+              <a:t>22/10/15</a:t>
             </a:fld>
             <a:endParaRPr lang="en-US"/>
           </a:p>
@@ -384,7 +385,7 @@
           <a:p>
             <a:fld id="{59F1AF83-5EC3-2645-9357-E8053F4E6264}" type="datetimeFigureOut">
               <a:rPr lang="en-US" smtClean="0"/>
-              <a:t>14/10/15</a:t>
+              <a:t>22/10/15</a:t>
             </a:fld>
             <a:endParaRPr lang="en-US"/>
           </a:p>
@@ -4190,13 +4191,6 @@
               </a:rPr>
               <a:t> </a:t>
             </a:r>
-            <a:endParaRPr lang="nl-NL" sz="6000" dirty="0" smtClean="0">
-              <a:solidFill>
-                <a:srgbClr val="F3A426"/>
-              </a:solidFill>
-              <a:latin typeface="Verdana"/>
-              <a:cs typeface="Verdana"/>
-            </a:endParaRPr>
           </a:p>
         </p:txBody>
       </p:sp>
@@ -4329,14 +4323,6 @@
                 </a:solidFill>
               </a:rPr>
               <a:t>your imaginative characters</a:t>
-            </a:r>
-            <a:r>
-              <a:rPr lang="en-US" sz="2800" dirty="0" smtClean="0">
-                <a:solidFill>
-                  <a:schemeClr val="tx1"/>
-                </a:solidFill>
-              </a:rPr>
-              <a:t/>
             </a:r>
             <a:br>
               <a:rPr lang="en-US" sz="2800" dirty="0" smtClean="0">
@@ -5169,11 +5155,7 @@
             </a:r>
             <a:r>
               <a:rPr lang="en-US" dirty="0" smtClean="0"/>
-              <a:t>prite </a:t>
-            </a:r>
-            <a:r>
-              <a:rPr lang="en-US" dirty="0" smtClean="0"/>
-              <a:t>information</a:t>
+              <a:t>prite information</a:t>
             </a:r>
             <a:endParaRPr lang="en-US" dirty="0"/>
           </a:p>
@@ -5398,11 +5380,7 @@
             </a:r>
             <a:r>
               <a:rPr lang="en-US" dirty="0" smtClean="0"/>
-              <a:t>prite </a:t>
-            </a:r>
-            <a:r>
-              <a:rPr lang="en-US" dirty="0" smtClean="0"/>
-              <a:t>information</a:t>
+              <a:t>prite information</a:t>
             </a:r>
             <a:endParaRPr lang="en-US" dirty="0"/>
           </a:p>
@@ -6188,10 +6166,6 @@
               </a:rPr>
               <a:t> area</a:t>
             </a:r>
-            <a:endParaRPr lang="nl-NL" sz="2400" dirty="0" smtClean="0">
-              <a:latin typeface="Verdana"/>
-              <a:cs typeface="Verdana"/>
-            </a:endParaRPr>
           </a:p>
         </p:txBody>
       </p:sp>
@@ -7296,14 +7270,7 @@
                 <a:latin typeface="Verdana"/>
                 <a:cs typeface="Verdana"/>
               </a:rPr>
-              <a:t>Scratch </a:t>
-            </a:r>
-            <a:r>
-              <a:rPr lang="en-US" dirty="0" smtClean="0">
-                <a:latin typeface="Verdana"/>
-                <a:cs typeface="Verdana"/>
-              </a:rPr>
-              <a:t>is a </a:t>
+              <a:t>Scratch is a </a:t>
             </a:r>
             <a:r>
               <a:rPr lang="en-US" b="1" dirty="0" smtClean="0">
@@ -7704,7 +7671,21 @@
                 <a:latin typeface="Verdana"/>
                 <a:cs typeface="Verdana"/>
               </a:rPr>
-              <a:t>It looks at your hands if you move them around the device</a:t>
+              <a:t>It </a:t>
+            </a:r>
+            <a:r>
+              <a:rPr lang="en-US" sz="2800" dirty="0" smtClean="0">
+                <a:latin typeface="Verdana"/>
+                <a:cs typeface="Verdana"/>
+              </a:rPr>
+              <a:t>looks at </a:t>
+            </a:r>
+            <a:r>
+              <a:rPr lang="en-US" sz="2800" dirty="0" smtClean="0">
+                <a:latin typeface="Verdana"/>
+                <a:cs typeface="Verdana"/>
+              </a:rPr>
+              <a:t>your hands if you move them around the device</a:t>
             </a:r>
           </a:p>
           <a:p>
@@ -7737,12 +7718,15 @@
                 <a:latin typeface="Verdana"/>
                 <a:cs typeface="Verdana"/>
               </a:rPr>
-              <a:t>determine the position of your hands and fingers</a:t>
-            </a:r>
-            <a:endParaRPr lang="en-US" sz="2800" dirty="0" smtClean="0">
-              <a:latin typeface="Verdana"/>
-              <a:cs typeface="Verdana"/>
-            </a:endParaRPr>
+              <a:t>It determines </a:t>
+            </a:r>
+            <a:r>
+              <a:rPr lang="en-US" sz="2800" dirty="0" smtClean="0">
+                <a:latin typeface="Verdana"/>
+                <a:cs typeface="Verdana"/>
+              </a:rPr>
+              <a:t>the position of your hands and fingers</a:t>
+            </a:r>
           </a:p>
         </p:txBody>
       </p:sp>
@@ -7807,10 +7791,6 @@
               <a:rPr lang="en-US" dirty="0" smtClean="0"/>
               <a:t>Leap Motion </a:t>
             </a:r>
-            <a:r>
-              <a:rPr lang="en-US" dirty="0" smtClean="0"/>
-              <a:t/>
-            </a:r>
             <a:br>
               <a:rPr lang="en-US" dirty="0" smtClean="0"/>
             </a:br>
@@ -7834,15 +7814,7 @@
                   <a:schemeClr val="tx1"/>
                 </a:solidFill>
               </a:rPr>
-              <a:t>Demo</a:t>
-            </a:r>
-            <a:r>
-              <a:rPr lang="en-US" dirty="0" smtClean="0">
-                <a:solidFill>
-                  <a:schemeClr val="tx1"/>
-                </a:solidFill>
-              </a:rPr>
-              <a:t>	</a:t>
+              <a:t>Demo	</a:t>
             </a:r>
             <a:endParaRPr lang="en-US" dirty="0">
               <a:solidFill>
@@ -8221,10 +8193,6 @@
               </a:rPr>
               <a:t>use it with</a:t>
             </a:r>
-            <a:endParaRPr lang="en-US" sz="2560" dirty="0" smtClean="0">
-              <a:latin typeface="Verdana"/>
-              <a:cs typeface="Verdana"/>
-            </a:endParaRPr>
           </a:p>
         </p:txBody>
       </p:sp>
@@ -8447,7 +8415,6 @@
           <p:cNvPr id="13" name="Straight Connector 12"/>
           <p:cNvCxnSpPr>
             <a:stCxn id="9" idx="2"/>
-            <a:endCxn id="7" idx="2"/>
           </p:cNvCxnSpPr>
           <p:nvPr/>
         </p:nvCxnSpPr>
@@ -8483,35 +8450,29 @@
       </p:cxnSp>
       <p:pic>
         <p:nvPicPr>
-          <p:cNvPr id="7" name="Picture 6" descr="Screen Shot 2015-09-09 at 20.50.37.png"/>
+          <p:cNvPr id="5" name="Picture 4"/>
           <p:cNvPicPr>
             <a:picLocks noChangeAspect="1"/>
           </p:cNvPicPr>
           <p:nvPr/>
         </p:nvPicPr>
         <p:blipFill>
-          <a:blip r:embed="rId3">
-            <a:extLst>
-              <a:ext uri="{28A0092B-C50C-407E-A947-70E740481C1C}">
-                <a14:useLocalDpi xmlns:a14="http://schemas.microsoft.com/office/drawing/2010/main" val="0"/>
-              </a:ext>
-            </a:extLst>
-          </a:blip>
+          <a:blip r:embed="rId3"/>
           <a:stretch>
             <a:fillRect/>
           </a:stretch>
         </p:blipFill>
         <p:spPr>
           <a:xfrm>
-            <a:off x="5334302" y="1417638"/>
-            <a:ext cx="2376110" cy="4370734"/>
+            <a:off x="6529527" y="1054386"/>
+            <a:ext cx="2140884" cy="5000843"/>
           </a:xfrm>
           <a:prstGeom prst="rect">
             <a:avLst/>
           </a:prstGeom>
           <a:ln>
             <a:solidFill>
-              <a:srgbClr val="F3A426"/>
+              <a:schemeClr val="accent6"/>
             </a:solidFill>
           </a:ln>
         </p:spPr>
@@ -8673,6 +8634,212 @@
     <p:extLst>
       <p:ext uri="{BB962C8B-B14F-4D97-AF65-F5344CB8AC3E}">
         <p14:creationId xmlns:p14="http://schemas.microsoft.com/office/powerpoint/2010/main" val="631294689"/>
+      </p:ext>
+    </p:extLst>
+  </p:cSld>
+  <p:clrMapOvr>
+    <a:masterClrMapping/>
+  </p:clrMapOvr>
+  <p:timing>
+    <p:tnLst>
+      <p:par>
+        <p:cTn xmlns:p14="http://schemas.microsoft.com/office/powerpoint/2010/main" id="1" dur="indefinite" restart="never" nodeType="tmRoot"/>
+      </p:par>
+    </p:tnLst>
+  </p:timing>
+</p:sld>
+</file>
+
+<file path=ppt/slides/slide25.xml><?xml version="1.0" encoding="utf-8"?>
+<p:sld xmlns:a="http://schemas.openxmlformats.org/drawingml/2006/main" xmlns:r="http://schemas.openxmlformats.org/officeDocument/2006/relationships" xmlns:p="http://schemas.openxmlformats.org/presentationml/2006/main">
+  <p:cSld>
+    <p:spTree>
+      <p:nvGrpSpPr>
+        <p:cNvPr id="1" name=""/>
+        <p:cNvGrpSpPr/>
+        <p:nvPr/>
+      </p:nvGrpSpPr>
+      <p:grpSpPr>
+        <a:xfrm>
+          <a:off x="0" y="0"/>
+          <a:ext cx="0" cy="0"/>
+          <a:chOff x="0" y="0"/>
+          <a:chExt cx="0" cy="0"/>
+        </a:xfrm>
+      </p:grpSpPr>
+      <p:sp>
+        <p:nvSpPr>
+          <p:cNvPr id="2" name="Title 1"/>
+          <p:cNvSpPr>
+            <a:spLocks noGrp="1"/>
+          </p:cNvSpPr>
+          <p:nvPr>
+            <p:ph type="ctrTitle"/>
+          </p:nvPr>
+        </p:nvSpPr>
+        <p:spPr>
+          <a:xfrm>
+            <a:off x="95843" y="2335816"/>
+            <a:ext cx="8913378" cy="1809834"/>
+          </a:xfrm>
+        </p:spPr>
+        <p:txBody>
+          <a:bodyPr/>
+          <a:lstStyle/>
+          <a:p>
+            <a:r>
+              <a:rPr lang="en-US" altLang="zh-TW" sz="3600" dirty="0" smtClean="0">
+                <a:latin typeface="Verdana"/>
+                <a:cs typeface="Verdana"/>
+              </a:rPr>
+              <a:t>Open </a:t>
+            </a:r>
+            <a:br>
+              <a:rPr lang="en-US" altLang="zh-TW" sz="3600" dirty="0" smtClean="0">
+                <a:latin typeface="Verdana"/>
+                <a:cs typeface="Verdana"/>
+              </a:rPr>
+            </a:br>
+            <a:r>
+              <a:rPr lang="en-US" altLang="zh-TW" sz="3600" dirty="0" smtClean="0">
+                <a:latin typeface="Verdana"/>
+                <a:cs typeface="Verdana"/>
+              </a:rPr>
+              <a:t>Scratch Leap Motion </a:t>
+            </a:r>
+            <a:r>
+              <a:rPr lang="en-US" altLang="zh-TW" sz="3600" dirty="0" err="1" smtClean="0">
+                <a:latin typeface="Verdana"/>
+                <a:cs typeface="Verdana"/>
+              </a:rPr>
+              <a:t>Workshop.pdf</a:t>
+            </a:r>
+            <a:r>
+              <a:rPr lang="en-US" altLang="zh-TW" sz="3600" dirty="0" smtClean="0">
+                <a:latin typeface="Verdana"/>
+                <a:cs typeface="Verdana"/>
+              </a:rPr>
+              <a:t/>
+            </a:r>
+            <a:br>
+              <a:rPr lang="en-US" altLang="zh-TW" sz="3600" dirty="0" smtClean="0">
+                <a:latin typeface="Verdana"/>
+                <a:cs typeface="Verdana"/>
+              </a:rPr>
+            </a:br>
+            <a:r>
+              <a:rPr lang="en-US" altLang="zh-TW" sz="3600" dirty="0" smtClean="0">
+                <a:latin typeface="Verdana"/>
+                <a:cs typeface="Verdana"/>
+              </a:rPr>
+              <a:t/>
+            </a:r>
+            <a:br>
+              <a:rPr lang="en-US" altLang="zh-TW" sz="3600" dirty="0" smtClean="0">
+                <a:latin typeface="Verdana"/>
+                <a:cs typeface="Verdana"/>
+              </a:rPr>
+            </a:br>
+            <a:r>
+              <a:rPr lang="en-US" altLang="zh-TW" sz="3600" dirty="0" smtClean="0">
+                <a:latin typeface="Verdana"/>
+                <a:cs typeface="Verdana"/>
+              </a:rPr>
+              <a:t>Start with Assignment 2</a:t>
+            </a:r>
+            <a:endParaRPr lang="en-US" sz="3600" dirty="0">
+              <a:latin typeface="Verdana"/>
+              <a:cs typeface="Verdana"/>
+            </a:endParaRPr>
+          </a:p>
+        </p:txBody>
+      </p:sp>
+      <p:pic>
+        <p:nvPicPr>
+          <p:cNvPr id="4" name="Picture 3" descr="scratch-logo"/>
+          <p:cNvPicPr>
+            <a:picLocks noChangeAspect="1" noChangeArrowheads="1"/>
+          </p:cNvPicPr>
+          <p:nvPr/>
+        </p:nvPicPr>
+        <p:blipFill>
+          <a:blip r:embed="rId2">
+            <a:extLst>
+              <a:ext uri="{28A0092B-C50C-407E-A947-70E740481C1C}">
+                <a14:useLocalDpi xmlns:a14="http://schemas.microsoft.com/office/drawing/2010/main" val="0"/>
+              </a:ext>
+            </a:extLst>
+          </a:blip>
+          <a:srcRect/>
+          <a:stretch>
+            <a:fillRect/>
+          </a:stretch>
+        </p:blipFill>
+        <p:spPr bwMode="auto">
+          <a:xfrm>
+            <a:off x="879929" y="5302930"/>
+            <a:ext cx="2667000" cy="804863"/>
+          </a:xfrm>
+          <a:prstGeom prst="rect">
+            <a:avLst/>
+          </a:prstGeom>
+          <a:noFill/>
+          <a:extLst>
+            <a:ext uri="{909E8E84-426E-40dd-AFC4-6F175D3DCCD1}">
+              <a14:hiddenFill xmlns:a14="http://schemas.microsoft.com/office/drawing/2010/main">
+                <a:solidFill>
+                  <a:srgbClr val="FFFFFF"/>
+                </a:solidFill>
+              </a14:hiddenFill>
+            </a:ext>
+          </a:extLst>
+        </p:spPr>
+      </p:pic>
+      <p:pic>
+        <p:nvPicPr>
+          <p:cNvPr id="5" name="Picture 4" descr="cat1-a"/>
+          <p:cNvPicPr>
+            <a:picLocks noChangeAspect="1" noChangeArrowheads="1"/>
+          </p:cNvPicPr>
+          <p:nvPr/>
+        </p:nvPicPr>
+        <p:blipFill>
+          <a:blip r:embed="rId3">
+            <a:extLst>
+              <a:ext uri="{28A0092B-C50C-407E-A947-70E740481C1C}">
+                <a14:useLocalDpi xmlns:a14="http://schemas.microsoft.com/office/drawing/2010/main" val="0"/>
+              </a:ext>
+            </a:extLst>
+          </a:blip>
+          <a:srcRect/>
+          <a:stretch>
+            <a:fillRect/>
+          </a:stretch>
+        </p:blipFill>
+        <p:spPr bwMode="auto">
+          <a:xfrm>
+            <a:off x="6183650" y="4666651"/>
+            <a:ext cx="1687513" cy="1971675"/>
+          </a:xfrm>
+          <a:prstGeom prst="rect">
+            <a:avLst/>
+          </a:prstGeom>
+          <a:noFill/>
+          <a:extLst>
+            <a:ext uri="{909E8E84-426E-40dd-AFC4-6F175D3DCCD1}">
+              <a14:hiddenFill xmlns:a14="http://schemas.microsoft.com/office/drawing/2010/main">
+                <a:solidFill>
+                  <a:srgbClr val="FFFFFF"/>
+                </a:solidFill>
+              </a14:hiddenFill>
+            </a:ext>
+          </a:extLst>
+        </p:spPr>
+      </p:pic>
+    </p:spTree>
+    <p:extLst>
+      <p:ext uri="{BB962C8B-B14F-4D97-AF65-F5344CB8AC3E}">
+        <p14:creationId xmlns:p14="http://schemas.microsoft.com/office/powerpoint/2010/main" val="1601094135"/>
       </p:ext>
     </p:extLst>
   </p:cSld>
@@ -10077,10 +10244,6 @@
               </a:rPr>
               <a:t>can: </a:t>
             </a:r>
-            <a:endParaRPr lang="en-US" dirty="0" smtClean="0">
-              <a:latin typeface="Verdana"/>
-              <a:cs typeface="Verdana"/>
-            </a:endParaRPr>
           </a:p>
           <a:p>
             <a:pPr lvl="1"/>
@@ -10105,10 +10268,6 @@
               </a:rPr>
               <a:t>talk to each other</a:t>
             </a:r>
-            <a:endParaRPr lang="en-US" dirty="0" smtClean="0">
-              <a:latin typeface="Verdana"/>
-              <a:cs typeface="Verdana"/>
-            </a:endParaRPr>
           </a:p>
           <a:p>
             <a:pPr lvl="1"/>

</xml_diff>